<commit_message>
Updated cluster diagram to show caches
</commit_message>
<xml_diff>
--- a/docs/img/cluster-overview.pptx
+++ b/docs/img/cluster-overview.pptx
@@ -3112,7 +3112,7 @@
           <a:solidFill>
             <a:schemeClr val="bg1"/>
           </a:solidFill>
-          <a:ln w="12700" cmpd="sng"/>
+          <a:ln w="9525" cmpd="sng"/>
           <a:effectLst>
             <a:outerShdw blurRad="63500" dist="38100" dir="2700000" algn="tl" rotWithShape="0">
               <a:prstClr val="black">
@@ -3168,7 +3168,7 @@
           <a:prstGeom prst="rect">
             <a:avLst/>
           </a:prstGeom>
-          <a:ln w="12700" cmpd="sng"/>
+          <a:ln w="9525" cmpd="sng"/>
           <a:effectLst>
             <a:outerShdw blurRad="63500" dist="38100" dir="2700000" algn="tl" rotWithShape="0">
               <a:prstClr val="black">
@@ -3212,26 +3212,25 @@
       </p:sp>
       <p:sp>
         <p:nvSpPr>
-          <p:cNvPr id="7" name="Rectangle 6"/>
+          <p:cNvPr id="15" name="Rectangle 14"/>
           <p:cNvSpPr/>
           <p:nvPr/>
         </p:nvSpPr>
         <p:spPr>
           <a:xfrm>
-            <a:off x="6446493" y="1346907"/>
-            <a:ext cx="1795580" cy="1521162"/>
+            <a:off x="1373196" y="2819381"/>
+            <a:ext cx="1540850" cy="534468"/>
           </a:xfrm>
           <a:prstGeom prst="rect">
             <a:avLst/>
           </a:prstGeom>
-          <a:ln w="12700" cmpd="sng"/>
-          <a:effectLst>
-            <a:outerShdw blurRad="63500" dist="38100" dir="2700000" algn="tl" rotWithShape="0">
-              <a:prstClr val="black">
-                <a:alpha val="20000"/>
-              </a:prstClr>
-            </a:outerShdw>
-          </a:effectLst>
+          <a:solidFill>
+            <a:schemeClr val="accent6">
+              <a:lumMod val="20000"/>
+              <a:lumOff val="80000"/>
+            </a:schemeClr>
+          </a:solidFill>
+          <a:ln w="9525" cmpd="sng"/>
         </p:spPr>
         <p:style>
           <a:lnRef idx="2">
@@ -3248,109 +3247,6 @@
           </a:fontRef>
         </p:style>
         <p:txBody>
-          <a:bodyPr tIns="91440" rtlCol="0" anchor="t"/>
-          <a:lstStyle/>
-          <a:p>
-            <a:r>
-              <a:rPr lang="en-US" sz="1500" dirty="0" smtClean="0">
-                <a:latin typeface="Helvetica Neue"/>
-                <a:cs typeface="Helvetica Neue"/>
-              </a:rPr>
-              <a:t> Worker Node</a:t>
-            </a:r>
-            <a:endParaRPr lang="en-US" sz="1500" dirty="0">
-              <a:latin typeface="Helvetica Neue"/>
-              <a:cs typeface="Helvetica Neue"/>
-            </a:endParaRPr>
-          </a:p>
-        </p:txBody>
-      </p:sp>
-      <p:sp>
-        <p:nvSpPr>
-          <p:cNvPr id="10" name="Rectangle 9"/>
-          <p:cNvSpPr/>
-          <p:nvPr/>
-        </p:nvSpPr>
-        <p:spPr>
-          <a:xfrm>
-            <a:off x="6573858" y="1816341"/>
-            <a:ext cx="1540850" cy="943788"/>
-          </a:xfrm>
-          <a:prstGeom prst="rect">
-            <a:avLst/>
-          </a:prstGeom>
-          <a:solidFill>
-            <a:schemeClr val="accent6">
-              <a:lumMod val="20000"/>
-              <a:lumOff val="80000"/>
-            </a:schemeClr>
-          </a:solidFill>
-          <a:ln w="12700" cmpd="sng"/>
-        </p:spPr>
-        <p:style>
-          <a:lnRef idx="2">
-            <a:schemeClr val="dk1"/>
-          </a:lnRef>
-          <a:fillRef idx="1">
-            <a:schemeClr val="lt1"/>
-          </a:fillRef>
-          <a:effectRef idx="0">
-            <a:schemeClr val="dk1"/>
-          </a:effectRef>
-          <a:fontRef idx="minor">
-            <a:schemeClr val="dk1"/>
-          </a:fontRef>
-        </p:style>
-        <p:txBody>
-          <a:bodyPr tIns="91440" rtlCol="0" anchor="t"/>
-          <a:lstStyle/>
-          <a:p>
-            <a:pPr algn="ctr"/>
-            <a:r>
-              <a:rPr lang="en-US" sz="1500" dirty="0" smtClean="0"/>
-              <a:t>Executor</a:t>
-            </a:r>
-            <a:endParaRPr lang="en-US" sz="1500" dirty="0"/>
-          </a:p>
-        </p:txBody>
-      </p:sp>
-      <p:sp>
-        <p:nvSpPr>
-          <p:cNvPr id="15" name="Rectangle 14"/>
-          <p:cNvSpPr/>
-          <p:nvPr/>
-        </p:nvSpPr>
-        <p:spPr>
-          <a:xfrm>
-            <a:off x="1373196" y="2819381"/>
-            <a:ext cx="1540850" cy="534468"/>
-          </a:xfrm>
-          <a:prstGeom prst="rect">
-            <a:avLst/>
-          </a:prstGeom>
-          <a:solidFill>
-            <a:schemeClr val="accent6">
-              <a:lumMod val="20000"/>
-              <a:lumOff val="80000"/>
-            </a:schemeClr>
-          </a:solidFill>
-          <a:ln w="12700" cmpd="sng"/>
-        </p:spPr>
-        <p:style>
-          <a:lnRef idx="2">
-            <a:schemeClr val="dk1"/>
-          </a:lnRef>
-          <a:fillRef idx="1">
-            <a:schemeClr val="lt1"/>
-          </a:fillRef>
-          <a:effectRef idx="0">
-            <a:schemeClr val="dk1"/>
-          </a:effectRef>
-          <a:fontRef idx="minor">
-            <a:schemeClr val="dk1"/>
-          </a:fontRef>
-        </p:style>
-        <p:txBody>
           <a:bodyPr rtlCol="0" anchor="ctr"/>
           <a:lstStyle/>
           <a:p>
@@ -3358,306 +3254,6 @@
             <a:r>
               <a:rPr lang="en-US" sz="1500" dirty="0" smtClean="0"/>
               <a:t>SparkContext</a:t>
-            </a:r>
-            <a:endParaRPr lang="en-US" sz="1500" dirty="0"/>
-          </a:p>
-        </p:txBody>
-      </p:sp>
-      <p:sp>
-        <p:nvSpPr>
-          <p:cNvPr id="17" name="Rectangle 16"/>
-          <p:cNvSpPr/>
-          <p:nvPr/>
-        </p:nvSpPr>
-        <p:spPr>
-          <a:xfrm>
-            <a:off x="7395438" y="2276105"/>
-            <a:ext cx="597025" cy="386603"/>
-          </a:xfrm>
-          <a:prstGeom prst="rect">
-            <a:avLst/>
-          </a:prstGeom>
-          <a:solidFill>
-            <a:schemeClr val="accent6">
-              <a:lumMod val="40000"/>
-              <a:lumOff val="60000"/>
-            </a:schemeClr>
-          </a:solidFill>
-          <a:ln w="12700" cmpd="sng"/>
-        </p:spPr>
-        <p:style>
-          <a:lnRef idx="2">
-            <a:schemeClr val="dk1"/>
-          </a:lnRef>
-          <a:fillRef idx="1">
-            <a:schemeClr val="lt1"/>
-          </a:fillRef>
-          <a:effectRef idx="0">
-            <a:schemeClr val="dk1"/>
-          </a:effectRef>
-          <a:fontRef idx="minor">
-            <a:schemeClr val="dk1"/>
-          </a:fontRef>
-        </p:style>
-        <p:txBody>
-          <a:bodyPr rtlCol="0" anchor="ctr"/>
-          <a:lstStyle/>
-          <a:p>
-            <a:pPr algn="ctr"/>
-            <a:r>
-              <a:rPr lang="en-US" sz="1500" dirty="0" smtClean="0"/>
-              <a:t>Task</a:t>
-            </a:r>
-            <a:endParaRPr lang="en-US" sz="1500" dirty="0"/>
-          </a:p>
-        </p:txBody>
-      </p:sp>
-      <p:sp>
-        <p:nvSpPr>
-          <p:cNvPr id="18" name="Rectangle 17"/>
-          <p:cNvSpPr/>
-          <p:nvPr/>
-        </p:nvSpPr>
-        <p:spPr>
-          <a:xfrm>
-            <a:off x="6681766" y="2276105"/>
-            <a:ext cx="597025" cy="386603"/>
-          </a:xfrm>
-          <a:prstGeom prst="rect">
-            <a:avLst/>
-          </a:prstGeom>
-          <a:solidFill>
-            <a:schemeClr val="accent6">
-              <a:lumMod val="40000"/>
-              <a:lumOff val="60000"/>
-            </a:schemeClr>
-          </a:solidFill>
-          <a:ln w="12700" cmpd="sng"/>
-        </p:spPr>
-        <p:style>
-          <a:lnRef idx="2">
-            <a:schemeClr val="dk1"/>
-          </a:lnRef>
-          <a:fillRef idx="1">
-            <a:schemeClr val="lt1"/>
-          </a:fillRef>
-          <a:effectRef idx="0">
-            <a:schemeClr val="dk1"/>
-          </a:effectRef>
-          <a:fontRef idx="minor">
-            <a:schemeClr val="dk1"/>
-          </a:fontRef>
-        </p:style>
-        <p:txBody>
-          <a:bodyPr rtlCol="0" anchor="ctr"/>
-          <a:lstStyle/>
-          <a:p>
-            <a:pPr algn="ctr"/>
-            <a:r>
-              <a:rPr lang="en-US" sz="1500" dirty="0" smtClean="0"/>
-              <a:t>Task</a:t>
-            </a:r>
-            <a:endParaRPr lang="en-US" sz="1500" dirty="0"/>
-          </a:p>
-        </p:txBody>
-      </p:sp>
-      <p:sp>
-        <p:nvSpPr>
-          <p:cNvPr id="19" name="Rectangle 18"/>
-          <p:cNvSpPr/>
-          <p:nvPr/>
-        </p:nvSpPr>
-        <p:spPr>
-          <a:xfrm>
-            <a:off x="6445841" y="3089893"/>
-            <a:ext cx="1795580" cy="1521162"/>
-          </a:xfrm>
-          <a:prstGeom prst="rect">
-            <a:avLst/>
-          </a:prstGeom>
-          <a:ln w="12700" cmpd="sng"/>
-          <a:effectLst>
-            <a:outerShdw blurRad="63500" dist="38100" dir="2700000" algn="tl" rotWithShape="0">
-              <a:prstClr val="black">
-                <a:alpha val="20000"/>
-              </a:prstClr>
-            </a:outerShdw>
-          </a:effectLst>
-        </p:spPr>
-        <p:style>
-          <a:lnRef idx="2">
-            <a:schemeClr val="dk1"/>
-          </a:lnRef>
-          <a:fillRef idx="1">
-            <a:schemeClr val="lt1"/>
-          </a:fillRef>
-          <a:effectRef idx="0">
-            <a:schemeClr val="dk1"/>
-          </a:effectRef>
-          <a:fontRef idx="minor">
-            <a:schemeClr val="dk1"/>
-          </a:fontRef>
-        </p:style>
-        <p:txBody>
-          <a:bodyPr tIns="91440" rtlCol="0" anchor="t"/>
-          <a:lstStyle/>
-          <a:p>
-            <a:r>
-              <a:rPr lang="en-US" sz="1500" dirty="0" smtClean="0">
-                <a:latin typeface="Helvetica Neue"/>
-                <a:cs typeface="Helvetica Neue"/>
-              </a:rPr>
-              <a:t> Worker Node</a:t>
-            </a:r>
-            <a:endParaRPr lang="en-US" sz="1500" dirty="0">
-              <a:latin typeface="Helvetica Neue"/>
-              <a:cs typeface="Helvetica Neue"/>
-            </a:endParaRPr>
-          </a:p>
-        </p:txBody>
-      </p:sp>
-      <p:sp>
-        <p:nvSpPr>
-          <p:cNvPr id="20" name="Rectangle 19"/>
-          <p:cNvSpPr/>
-          <p:nvPr/>
-        </p:nvSpPr>
-        <p:spPr>
-          <a:xfrm>
-            <a:off x="6573206" y="3559327"/>
-            <a:ext cx="1540850" cy="943788"/>
-          </a:xfrm>
-          <a:prstGeom prst="rect">
-            <a:avLst/>
-          </a:prstGeom>
-          <a:solidFill>
-            <a:schemeClr val="accent6">
-              <a:lumMod val="20000"/>
-              <a:lumOff val="80000"/>
-            </a:schemeClr>
-          </a:solidFill>
-          <a:ln w="12700" cmpd="sng"/>
-        </p:spPr>
-        <p:style>
-          <a:lnRef idx="2">
-            <a:schemeClr val="dk1"/>
-          </a:lnRef>
-          <a:fillRef idx="1">
-            <a:schemeClr val="lt1"/>
-          </a:fillRef>
-          <a:effectRef idx="0">
-            <a:schemeClr val="dk1"/>
-          </a:effectRef>
-          <a:fontRef idx="minor">
-            <a:schemeClr val="dk1"/>
-          </a:fontRef>
-        </p:style>
-        <p:txBody>
-          <a:bodyPr tIns="91440" rtlCol="0" anchor="t"/>
-          <a:lstStyle/>
-          <a:p>
-            <a:pPr algn="ctr"/>
-            <a:r>
-              <a:rPr lang="en-US" sz="1500" dirty="0" smtClean="0"/>
-              <a:t>Executor</a:t>
-            </a:r>
-            <a:endParaRPr lang="en-US" sz="1500" dirty="0"/>
-          </a:p>
-        </p:txBody>
-      </p:sp>
-      <p:sp>
-        <p:nvSpPr>
-          <p:cNvPr id="21" name="Rectangle 20"/>
-          <p:cNvSpPr/>
-          <p:nvPr/>
-        </p:nvSpPr>
-        <p:spPr>
-          <a:xfrm>
-            <a:off x="7394786" y="4019091"/>
-            <a:ext cx="597025" cy="386603"/>
-          </a:xfrm>
-          <a:prstGeom prst="rect">
-            <a:avLst/>
-          </a:prstGeom>
-          <a:solidFill>
-            <a:schemeClr val="accent6">
-              <a:lumMod val="40000"/>
-              <a:lumOff val="60000"/>
-            </a:schemeClr>
-          </a:solidFill>
-          <a:ln w="12700" cmpd="sng"/>
-        </p:spPr>
-        <p:style>
-          <a:lnRef idx="2">
-            <a:schemeClr val="dk1"/>
-          </a:lnRef>
-          <a:fillRef idx="1">
-            <a:schemeClr val="lt1"/>
-          </a:fillRef>
-          <a:effectRef idx="0">
-            <a:schemeClr val="dk1"/>
-          </a:effectRef>
-          <a:fontRef idx="minor">
-            <a:schemeClr val="dk1"/>
-          </a:fontRef>
-        </p:style>
-        <p:txBody>
-          <a:bodyPr rtlCol="0" anchor="ctr"/>
-          <a:lstStyle/>
-          <a:p>
-            <a:pPr algn="ctr"/>
-            <a:r>
-              <a:rPr lang="en-US" sz="1500" dirty="0" smtClean="0"/>
-              <a:t>Task</a:t>
-            </a:r>
-            <a:endParaRPr lang="en-US" sz="1500" dirty="0"/>
-          </a:p>
-        </p:txBody>
-      </p:sp>
-      <p:sp>
-        <p:nvSpPr>
-          <p:cNvPr id="22" name="Rectangle 21"/>
-          <p:cNvSpPr/>
-          <p:nvPr/>
-        </p:nvSpPr>
-        <p:spPr>
-          <a:xfrm>
-            <a:off x="6681114" y="4019091"/>
-            <a:ext cx="597025" cy="386603"/>
-          </a:xfrm>
-          <a:prstGeom prst="rect">
-            <a:avLst/>
-          </a:prstGeom>
-          <a:solidFill>
-            <a:schemeClr val="accent6">
-              <a:lumMod val="40000"/>
-              <a:lumOff val="60000"/>
-            </a:schemeClr>
-          </a:solidFill>
-          <a:ln w="12700" cmpd="sng"/>
-        </p:spPr>
-        <p:style>
-          <a:lnRef idx="2">
-            <a:schemeClr val="dk1"/>
-          </a:lnRef>
-          <a:fillRef idx="1">
-            <a:schemeClr val="lt1"/>
-          </a:fillRef>
-          <a:effectRef idx="0">
-            <a:schemeClr val="dk1"/>
-          </a:effectRef>
-          <a:fontRef idx="minor">
-            <a:schemeClr val="dk1"/>
-          </a:fontRef>
-        </p:style>
-        <p:txBody>
-          <a:bodyPr rtlCol="0" anchor="ctr"/>
-          <a:lstStyle/>
-          <a:p>
-            <a:pPr algn="ctr"/>
-            <a:r>
-              <a:rPr lang="en-US" sz="1500" dirty="0" smtClean="0"/>
-              <a:t>Task</a:t>
             </a:r>
             <a:endParaRPr lang="en-US" sz="1500" dirty="0"/>
           </a:p>
@@ -3715,8 +3311,8 @@
         </p:nvCxnSpPr>
         <p:spPr>
           <a:xfrm flipV="1">
-            <a:off x="5645366" y="2107488"/>
-            <a:ext cx="801127" cy="976896"/>
+            <a:off x="5645366" y="2119835"/>
+            <a:ext cx="801127" cy="964549"/>
           </a:xfrm>
           <a:prstGeom prst="straightConnector1">
             <a:avLst/>
@@ -3750,14 +3346,14 @@
           <p:cNvPr id="28" name="Straight Arrow Connector 27"/>
           <p:cNvCxnSpPr>
             <a:stCxn id="6" idx="3"/>
-            <a:endCxn id="19" idx="1"/>
+            <a:endCxn id="44" idx="1"/>
           </p:cNvCxnSpPr>
           <p:nvPr/>
         </p:nvCxnSpPr>
         <p:spPr>
           <a:xfrm>
             <a:off x="5645366" y="3084384"/>
-            <a:ext cx="800475" cy="766090"/>
+            <a:ext cx="801127" cy="832764"/>
           </a:xfrm>
           <a:prstGeom prst="straightConnector1">
             <a:avLst/>
@@ -3786,6 +3382,514 @@
           </a:fontRef>
         </p:style>
       </p:cxnSp>
+      <p:sp>
+        <p:nvSpPr>
+          <p:cNvPr id="7" name="Rectangle 6"/>
+          <p:cNvSpPr/>
+          <p:nvPr/>
+        </p:nvSpPr>
+        <p:spPr>
+          <a:xfrm>
+            <a:off x="6446493" y="1371600"/>
+            <a:ext cx="1966482" cy="1496469"/>
+          </a:xfrm>
+          <a:prstGeom prst="rect">
+            <a:avLst/>
+          </a:prstGeom>
+          <a:ln w="9525" cmpd="sng"/>
+          <a:effectLst>
+            <a:outerShdw blurRad="63500" dist="38100" dir="2700000" algn="tl" rotWithShape="0">
+              <a:prstClr val="black">
+                <a:alpha val="20000"/>
+              </a:prstClr>
+            </a:outerShdw>
+          </a:effectLst>
+        </p:spPr>
+        <p:style>
+          <a:lnRef idx="2">
+            <a:schemeClr val="dk1"/>
+          </a:lnRef>
+          <a:fillRef idx="1">
+            <a:schemeClr val="lt1"/>
+          </a:fillRef>
+          <a:effectRef idx="0">
+            <a:schemeClr val="dk1"/>
+          </a:effectRef>
+          <a:fontRef idx="minor">
+            <a:schemeClr val="dk1"/>
+          </a:fontRef>
+        </p:style>
+        <p:txBody>
+          <a:bodyPr tIns="91440" rtlCol="0" anchor="t"/>
+          <a:lstStyle/>
+          <a:p>
+            <a:r>
+              <a:rPr lang="en-US" sz="1500" dirty="0" smtClean="0">
+                <a:latin typeface="Helvetica Neue"/>
+                <a:cs typeface="Helvetica Neue"/>
+              </a:rPr>
+              <a:t> Worker Node</a:t>
+            </a:r>
+            <a:endParaRPr lang="en-US" sz="1500" dirty="0">
+              <a:latin typeface="Helvetica Neue"/>
+              <a:cs typeface="Helvetica Neue"/>
+            </a:endParaRPr>
+          </a:p>
+        </p:txBody>
+      </p:sp>
+      <p:sp>
+        <p:nvSpPr>
+          <p:cNvPr id="10" name="Rectangle 9"/>
+          <p:cNvSpPr/>
+          <p:nvPr/>
+        </p:nvSpPr>
+        <p:spPr>
+          <a:xfrm>
+            <a:off x="6566665" y="1793155"/>
+            <a:ext cx="1735251" cy="966974"/>
+          </a:xfrm>
+          <a:prstGeom prst="rect">
+            <a:avLst/>
+          </a:prstGeom>
+          <a:solidFill>
+            <a:schemeClr val="accent6">
+              <a:lumMod val="20000"/>
+              <a:lumOff val="80000"/>
+            </a:schemeClr>
+          </a:solidFill>
+          <a:ln w="9525" cmpd="sng"/>
+        </p:spPr>
+        <p:style>
+          <a:lnRef idx="2">
+            <a:schemeClr val="dk1"/>
+          </a:lnRef>
+          <a:fillRef idx="1">
+            <a:schemeClr val="lt1"/>
+          </a:fillRef>
+          <a:effectRef idx="0">
+            <a:schemeClr val="dk1"/>
+          </a:effectRef>
+          <a:fontRef idx="minor">
+            <a:schemeClr val="dk1"/>
+          </a:fontRef>
+        </p:style>
+        <p:txBody>
+          <a:bodyPr tIns="91440" rtlCol="0" anchor="t"/>
+          <a:lstStyle/>
+          <a:p>
+            <a:r>
+              <a:rPr lang="en-US" sz="800" dirty="0" smtClean="0"/>
+              <a:t> </a:t>
+            </a:r>
+            <a:r>
+              <a:rPr lang="en-US" sz="1500" dirty="0" smtClean="0"/>
+              <a:t>Executor</a:t>
+            </a:r>
+            <a:endParaRPr lang="en-US" sz="1500" dirty="0"/>
+          </a:p>
+        </p:txBody>
+      </p:sp>
+      <p:sp>
+        <p:nvSpPr>
+          <p:cNvPr id="17" name="Rectangle 16"/>
+          <p:cNvSpPr/>
+          <p:nvPr/>
+        </p:nvSpPr>
+        <p:spPr>
+          <a:xfrm>
+            <a:off x="7497585" y="2276105"/>
+            <a:ext cx="715733" cy="386603"/>
+          </a:xfrm>
+          <a:prstGeom prst="rect">
+            <a:avLst/>
+          </a:prstGeom>
+          <a:solidFill>
+            <a:schemeClr val="accent6">
+              <a:lumMod val="40000"/>
+              <a:lumOff val="60000"/>
+            </a:schemeClr>
+          </a:solidFill>
+          <a:ln w="9525" cmpd="sng"/>
+        </p:spPr>
+        <p:style>
+          <a:lnRef idx="2">
+            <a:schemeClr val="dk1"/>
+          </a:lnRef>
+          <a:fillRef idx="1">
+            <a:schemeClr val="lt1"/>
+          </a:fillRef>
+          <a:effectRef idx="0">
+            <a:schemeClr val="dk1"/>
+          </a:effectRef>
+          <a:fontRef idx="minor">
+            <a:schemeClr val="dk1"/>
+          </a:fontRef>
+        </p:style>
+        <p:txBody>
+          <a:bodyPr rtlCol="0" anchor="ctr"/>
+          <a:lstStyle/>
+          <a:p>
+            <a:pPr algn="ctr"/>
+            <a:r>
+              <a:rPr lang="en-US" sz="1500" dirty="0" smtClean="0"/>
+              <a:t>Task</a:t>
+            </a:r>
+            <a:endParaRPr lang="en-US" sz="1500" dirty="0"/>
+          </a:p>
+        </p:txBody>
+      </p:sp>
+      <p:sp>
+        <p:nvSpPr>
+          <p:cNvPr id="18" name="Rectangle 17"/>
+          <p:cNvSpPr/>
+          <p:nvPr/>
+        </p:nvSpPr>
+        <p:spPr>
+          <a:xfrm>
+            <a:off x="6668479" y="2276105"/>
+            <a:ext cx="715733" cy="386603"/>
+          </a:xfrm>
+          <a:prstGeom prst="rect">
+            <a:avLst/>
+          </a:prstGeom>
+          <a:solidFill>
+            <a:schemeClr val="accent6">
+              <a:lumMod val="40000"/>
+              <a:lumOff val="60000"/>
+            </a:schemeClr>
+          </a:solidFill>
+          <a:ln w="9525" cmpd="sng"/>
+        </p:spPr>
+        <p:style>
+          <a:lnRef idx="2">
+            <a:schemeClr val="dk1"/>
+          </a:lnRef>
+          <a:fillRef idx="1">
+            <a:schemeClr val="lt1"/>
+          </a:fillRef>
+          <a:effectRef idx="0">
+            <a:schemeClr val="dk1"/>
+          </a:effectRef>
+          <a:fontRef idx="minor">
+            <a:schemeClr val="dk1"/>
+          </a:fontRef>
+        </p:style>
+        <p:txBody>
+          <a:bodyPr rtlCol="0" anchor="ctr"/>
+          <a:lstStyle/>
+          <a:p>
+            <a:pPr algn="ctr"/>
+            <a:r>
+              <a:rPr lang="en-US" sz="1500" dirty="0" smtClean="0"/>
+              <a:t>Task</a:t>
+            </a:r>
+            <a:endParaRPr lang="en-US" sz="1500" dirty="0"/>
+          </a:p>
+        </p:txBody>
+      </p:sp>
+      <p:sp>
+        <p:nvSpPr>
+          <p:cNvPr id="39" name="Rectangle 38"/>
+          <p:cNvSpPr/>
+          <p:nvPr/>
+        </p:nvSpPr>
+        <p:spPr>
+          <a:xfrm>
+            <a:off x="7536984" y="1793155"/>
+            <a:ext cx="764931" cy="386603"/>
+          </a:xfrm>
+          <a:prstGeom prst="rect">
+            <a:avLst/>
+          </a:prstGeom>
+          <a:solidFill>
+            <a:schemeClr val="accent6">
+              <a:lumMod val="40000"/>
+              <a:lumOff val="60000"/>
+            </a:schemeClr>
+          </a:solidFill>
+          <a:ln w="9525" cmpd="sng"/>
+        </p:spPr>
+        <p:style>
+          <a:lnRef idx="2">
+            <a:schemeClr val="dk1"/>
+          </a:lnRef>
+          <a:fillRef idx="1">
+            <a:schemeClr val="lt1"/>
+          </a:fillRef>
+          <a:effectRef idx="0">
+            <a:schemeClr val="dk1"/>
+          </a:effectRef>
+          <a:fontRef idx="minor">
+            <a:schemeClr val="dk1"/>
+          </a:fontRef>
+        </p:style>
+        <p:txBody>
+          <a:bodyPr rtlCol="0" anchor="ctr"/>
+          <a:lstStyle/>
+          <a:p>
+            <a:pPr algn="ctr"/>
+            <a:r>
+              <a:rPr lang="en-US" sz="1500" dirty="0" smtClean="0"/>
+              <a:t>Cache</a:t>
+            </a:r>
+            <a:endParaRPr lang="en-US" sz="1500" dirty="0"/>
+          </a:p>
+        </p:txBody>
+      </p:sp>
+      <p:sp>
+        <p:nvSpPr>
+          <p:cNvPr id="44" name="Rectangle 43"/>
+          <p:cNvSpPr/>
+          <p:nvPr/>
+        </p:nvSpPr>
+        <p:spPr>
+          <a:xfrm>
+            <a:off x="6446493" y="3168913"/>
+            <a:ext cx="1966482" cy="1496469"/>
+          </a:xfrm>
+          <a:prstGeom prst="rect">
+            <a:avLst/>
+          </a:prstGeom>
+          <a:ln w="9525" cmpd="sng"/>
+          <a:effectLst>
+            <a:outerShdw blurRad="63500" dist="38100" dir="2700000" algn="tl" rotWithShape="0">
+              <a:prstClr val="black">
+                <a:alpha val="20000"/>
+              </a:prstClr>
+            </a:outerShdw>
+          </a:effectLst>
+        </p:spPr>
+        <p:style>
+          <a:lnRef idx="2">
+            <a:schemeClr val="dk1"/>
+          </a:lnRef>
+          <a:fillRef idx="1">
+            <a:schemeClr val="lt1"/>
+          </a:fillRef>
+          <a:effectRef idx="0">
+            <a:schemeClr val="dk1"/>
+          </a:effectRef>
+          <a:fontRef idx="minor">
+            <a:schemeClr val="dk1"/>
+          </a:fontRef>
+        </p:style>
+        <p:txBody>
+          <a:bodyPr tIns="91440" rtlCol="0" anchor="t"/>
+          <a:lstStyle/>
+          <a:p>
+            <a:r>
+              <a:rPr lang="en-US" sz="1500" dirty="0" smtClean="0">
+                <a:latin typeface="Helvetica Neue"/>
+                <a:cs typeface="Helvetica Neue"/>
+              </a:rPr>
+              <a:t> Worker Node</a:t>
+            </a:r>
+            <a:endParaRPr lang="en-US" sz="1500" dirty="0">
+              <a:latin typeface="Helvetica Neue"/>
+              <a:cs typeface="Helvetica Neue"/>
+            </a:endParaRPr>
+          </a:p>
+        </p:txBody>
+      </p:sp>
+      <p:sp>
+        <p:nvSpPr>
+          <p:cNvPr id="45" name="Rectangle 44"/>
+          <p:cNvSpPr/>
+          <p:nvPr/>
+        </p:nvSpPr>
+        <p:spPr>
+          <a:xfrm>
+            <a:off x="6566665" y="3590468"/>
+            <a:ext cx="1735251" cy="966974"/>
+          </a:xfrm>
+          <a:prstGeom prst="rect">
+            <a:avLst/>
+          </a:prstGeom>
+          <a:solidFill>
+            <a:schemeClr val="accent6">
+              <a:lumMod val="20000"/>
+              <a:lumOff val="80000"/>
+            </a:schemeClr>
+          </a:solidFill>
+          <a:ln w="9525" cmpd="sng"/>
+        </p:spPr>
+        <p:style>
+          <a:lnRef idx="2">
+            <a:schemeClr val="dk1"/>
+          </a:lnRef>
+          <a:fillRef idx="1">
+            <a:schemeClr val="lt1"/>
+          </a:fillRef>
+          <a:effectRef idx="0">
+            <a:schemeClr val="dk1"/>
+          </a:effectRef>
+          <a:fontRef idx="minor">
+            <a:schemeClr val="dk1"/>
+          </a:fontRef>
+        </p:style>
+        <p:txBody>
+          <a:bodyPr tIns="91440" rtlCol="0" anchor="t"/>
+          <a:lstStyle/>
+          <a:p>
+            <a:r>
+              <a:rPr lang="en-US" sz="800" dirty="0" smtClean="0"/>
+              <a:t> </a:t>
+            </a:r>
+            <a:r>
+              <a:rPr lang="en-US" sz="1500" dirty="0" smtClean="0"/>
+              <a:t>Executor</a:t>
+            </a:r>
+            <a:endParaRPr lang="en-US" sz="1500" dirty="0"/>
+          </a:p>
+        </p:txBody>
+      </p:sp>
+      <p:sp>
+        <p:nvSpPr>
+          <p:cNvPr id="46" name="Rectangle 45"/>
+          <p:cNvSpPr/>
+          <p:nvPr/>
+        </p:nvSpPr>
+        <p:spPr>
+          <a:xfrm>
+            <a:off x="7497585" y="4073418"/>
+            <a:ext cx="715733" cy="386603"/>
+          </a:xfrm>
+          <a:prstGeom prst="rect">
+            <a:avLst/>
+          </a:prstGeom>
+          <a:solidFill>
+            <a:schemeClr val="accent6">
+              <a:lumMod val="40000"/>
+              <a:lumOff val="60000"/>
+            </a:schemeClr>
+          </a:solidFill>
+          <a:ln w="9525" cmpd="sng"/>
+        </p:spPr>
+        <p:style>
+          <a:lnRef idx="2">
+            <a:schemeClr val="dk1"/>
+          </a:lnRef>
+          <a:fillRef idx="1">
+            <a:schemeClr val="lt1"/>
+          </a:fillRef>
+          <a:effectRef idx="0">
+            <a:schemeClr val="dk1"/>
+          </a:effectRef>
+          <a:fontRef idx="minor">
+            <a:schemeClr val="dk1"/>
+          </a:fontRef>
+        </p:style>
+        <p:txBody>
+          <a:bodyPr rtlCol="0" anchor="ctr"/>
+          <a:lstStyle/>
+          <a:p>
+            <a:pPr algn="ctr"/>
+            <a:r>
+              <a:rPr lang="en-US" sz="1500" dirty="0" smtClean="0"/>
+              <a:t>Task</a:t>
+            </a:r>
+            <a:endParaRPr lang="en-US" sz="1500" dirty="0"/>
+          </a:p>
+        </p:txBody>
+      </p:sp>
+      <p:sp>
+        <p:nvSpPr>
+          <p:cNvPr id="47" name="Rectangle 46"/>
+          <p:cNvSpPr/>
+          <p:nvPr/>
+        </p:nvSpPr>
+        <p:spPr>
+          <a:xfrm>
+            <a:off x="6668479" y="4073418"/>
+            <a:ext cx="715733" cy="386603"/>
+          </a:xfrm>
+          <a:prstGeom prst="rect">
+            <a:avLst/>
+          </a:prstGeom>
+          <a:solidFill>
+            <a:schemeClr val="accent6">
+              <a:lumMod val="40000"/>
+              <a:lumOff val="60000"/>
+            </a:schemeClr>
+          </a:solidFill>
+          <a:ln w="9525" cmpd="sng"/>
+        </p:spPr>
+        <p:style>
+          <a:lnRef idx="2">
+            <a:schemeClr val="dk1"/>
+          </a:lnRef>
+          <a:fillRef idx="1">
+            <a:schemeClr val="lt1"/>
+          </a:fillRef>
+          <a:effectRef idx="0">
+            <a:schemeClr val="dk1"/>
+          </a:effectRef>
+          <a:fontRef idx="minor">
+            <a:schemeClr val="dk1"/>
+          </a:fontRef>
+        </p:style>
+        <p:txBody>
+          <a:bodyPr rtlCol="0" anchor="ctr"/>
+          <a:lstStyle/>
+          <a:p>
+            <a:pPr algn="ctr"/>
+            <a:r>
+              <a:rPr lang="en-US" sz="1500" dirty="0" smtClean="0"/>
+              <a:t>Task</a:t>
+            </a:r>
+            <a:endParaRPr lang="en-US" sz="1500" dirty="0"/>
+          </a:p>
+        </p:txBody>
+      </p:sp>
+      <p:sp>
+        <p:nvSpPr>
+          <p:cNvPr id="48" name="Rectangle 47"/>
+          <p:cNvSpPr/>
+          <p:nvPr/>
+        </p:nvSpPr>
+        <p:spPr>
+          <a:xfrm>
+            <a:off x="7536984" y="3590468"/>
+            <a:ext cx="764931" cy="386603"/>
+          </a:xfrm>
+          <a:prstGeom prst="rect">
+            <a:avLst/>
+          </a:prstGeom>
+          <a:solidFill>
+            <a:schemeClr val="accent6">
+              <a:lumMod val="40000"/>
+              <a:lumOff val="60000"/>
+            </a:schemeClr>
+          </a:solidFill>
+          <a:ln w="9525" cmpd="sng"/>
+        </p:spPr>
+        <p:style>
+          <a:lnRef idx="2">
+            <a:schemeClr val="dk1"/>
+          </a:lnRef>
+          <a:fillRef idx="1">
+            <a:schemeClr val="lt1"/>
+          </a:fillRef>
+          <a:effectRef idx="0">
+            <a:schemeClr val="dk1"/>
+          </a:effectRef>
+          <a:fontRef idx="minor">
+            <a:schemeClr val="dk1"/>
+          </a:fontRef>
+        </p:style>
+        <p:txBody>
+          <a:bodyPr rtlCol="0" anchor="ctr"/>
+          <a:lstStyle/>
+          <a:p>
+            <a:pPr algn="ctr"/>
+            <a:r>
+              <a:rPr lang="en-US" sz="1500" dirty="0" smtClean="0"/>
+              <a:t>Cache</a:t>
+            </a:r>
+            <a:endParaRPr lang="en-US" sz="1500" dirty="0"/>
+          </a:p>
+        </p:txBody>
+      </p:sp>
       <p:cxnSp>
         <p:nvCxnSpPr>
           <p:cNvPr id="35" name="Straight Arrow Connector 34"/>
@@ -3794,8 +3898,8 @@
         </p:nvCxnSpPr>
         <p:spPr>
           <a:xfrm flipV="1">
-            <a:off x="7946594" y="2760129"/>
-            <a:ext cx="652" cy="799198"/>
+            <a:off x="7988570" y="2760129"/>
+            <a:ext cx="615" cy="830339"/>
           </a:xfrm>
           <a:prstGeom prst="straightConnector1">
             <a:avLst/>

</xml_diff>